<commit_message>
intermediate after meeting with marc
</commit_message>
<xml_diff>
--- a/defense/Rough_slides.pptx
+++ b/defense/Rough_slides.pptx
@@ -5107,7 +5107,6 @@
               <a:rPr lang="en-US"/>
               <a:t>Standoff distance</a:t>
             </a:r>
-            <a:endParaRPr lang="en-US"/>
           </a:p>
         </p:txBody>
       </p:sp>
@@ -5141,6 +5140,36 @@
           <a:chExt cx="0" cy="0"/>
         </a:xfrm>
       </p:grpSpPr>
+      <p:pic>
+        <p:nvPicPr>
+          <p:cNvPr id="2" name="Picture 1"/>
+          <p:cNvPicPr>
+            <a:picLocks noChangeAspect="1"/>
+          </p:cNvPicPr>
+          <p:nvPr/>
+        </p:nvPicPr>
+        <p:blipFill>
+          <a:blip r:embed="rId2">
+            <a:extLst>
+              <a:ext uri="{28A0092B-C50C-407E-A947-70E740481C1C}">
+                <a14:useLocalDpi xmlns:a14="http://schemas.microsoft.com/office/drawing/2010/main" val="0"/>
+              </a:ext>
+            </a:extLst>
+          </a:blip>
+          <a:stretch>
+            <a:fillRect/>
+          </a:stretch>
+        </p:blipFill>
+        <p:spPr>
+          <a:xfrm>
+            <a:off x="785787" y="1174376"/>
+            <a:ext cx="6045319" cy="4186383"/>
+          </a:xfrm>
+          <a:prstGeom prst="rect">
+            <a:avLst/>
+          </a:prstGeom>
+        </p:spPr>
+      </p:pic>
     </p:spTree>
     <p:extLst>
       <p:ext uri="{BB962C8B-B14F-4D97-AF65-F5344CB8AC3E}">

</xml_diff>